<commit_message>
Most of lecture 22..
</commit_message>
<xml_diff>
--- a/classes/prog2016/Prog3-Lecture22.pptx
+++ b/classes/prog2016/Prog3-Lecture22.pptx
@@ -21,6 +21,10 @@
     <p:sldId id="270" r:id="rId15"/>
     <p:sldId id="271" r:id="rId16"/>
     <p:sldId id="272" r:id="rId17"/>
+    <p:sldId id="273" r:id="rId18"/>
+    <p:sldId id="274" r:id="rId19"/>
+    <p:sldId id="275" r:id="rId20"/>
+    <p:sldId id="276" r:id="rId21"/>
   </p:sldIdLst>
   <p:sldSz cx="12192000" cy="6858000"/>
   <p:notesSz cx="6858000" cy="9144000"/>
@@ -3288,6 +3292,38 @@
           </a:prstGeom>
         </p:spPr>
       </p:pic>
+      <p:sp>
+        <p:nvSpPr>
+          <p:cNvPr id="5" name="Rectangle 4"/>
+          <p:cNvSpPr/>
+          <p:nvPr/>
+        </p:nvSpPr>
+        <p:spPr>
+          <a:xfrm>
+            <a:off x="5320859" y="6575959"/>
+            <a:ext cx="8880048" cy="292388"/>
+          </a:xfrm>
+          <a:prstGeom prst="rect">
+            <a:avLst/>
+          </a:prstGeom>
+        </p:spPr>
+        <p:txBody>
+          <a:bodyPr wrap="square">
+            <a:spAutoFit/>
+          </a:bodyPr>
+          <a:lstStyle/>
+          <a:p>
+            <a:r>
+              <a:rPr lang="en-US" sz="1300" dirty="0">
+                <a:solidFill>
+                  <a:srgbClr val="FF0000"/>
+                </a:solidFill>
+              </a:rPr>
+              <a:t>https://github.com/afodor/WekaExamples/blob/master/src/examples/TestClassify.java</a:t>
+            </a:r>
+          </a:p>
+        </p:txBody>
+      </p:sp>
     </p:spTree>
     <p:extLst>
       <p:ext uri="{BB962C8B-B14F-4D97-AF65-F5344CB8AC3E}">
@@ -3551,7 +3587,7 @@
         </p:blipFill>
         <p:spPr>
           <a:xfrm>
-            <a:off x="1341602" y="4007049"/>
+            <a:off x="1127846" y="3683883"/>
             <a:ext cx="3286125" cy="2257425"/>
           </a:xfrm>
           <a:prstGeom prst="rect">
@@ -3559,6 +3595,34 @@
           </a:prstGeom>
         </p:spPr>
       </p:pic>
+      <p:sp>
+        <p:nvSpPr>
+          <p:cNvPr id="7" name="Rectangle 6"/>
+          <p:cNvSpPr/>
+          <p:nvPr/>
+        </p:nvSpPr>
+        <p:spPr>
+          <a:xfrm>
+            <a:off x="5601191" y="6489902"/>
+            <a:ext cx="6096000" cy="276999"/>
+          </a:xfrm>
+          <a:prstGeom prst="rect">
+            <a:avLst/>
+          </a:prstGeom>
+        </p:spPr>
+        <p:txBody>
+          <a:bodyPr>
+            <a:spAutoFit/>
+          </a:bodyPr>
+          <a:lstStyle/>
+          <a:p>
+            <a:r>
+              <a:rPr lang="en-US" sz="1200" dirty="0"/>
+              <a:t>https://github.com/afodor/WekaExamples/blob/master/src/examples/RunOneROCCurve.java</a:t>
+            </a:r>
+          </a:p>
+        </p:txBody>
+      </p:sp>
     </p:spTree>
     <p:extLst>
       <p:ext uri="{BB962C8B-B14F-4D97-AF65-F5344CB8AC3E}">
@@ -3605,7 +3669,7 @@
         </p:blipFill>
         <p:spPr>
           <a:xfrm>
-            <a:off x="1844632" y="348280"/>
+            <a:off x="110834" y="348280"/>
             <a:ext cx="7480620" cy="5815013"/>
           </a:xfrm>
           <a:prstGeom prst="rect">
@@ -3621,7 +3685,7 @@
         </p:nvCxnSpPr>
         <p:spPr>
           <a:xfrm flipH="1" flipV="1">
-            <a:off x="5593277" y="2719448"/>
+            <a:off x="3859479" y="2719448"/>
             <a:ext cx="1104405" cy="11875"/>
           </a:xfrm>
           <a:prstGeom prst="straightConnector1">
@@ -3654,7 +3718,7 @@
         </p:nvCxnSpPr>
         <p:spPr>
           <a:xfrm flipH="1">
-            <a:off x="6958939" y="5189515"/>
+            <a:off x="5225141" y="5189515"/>
             <a:ext cx="795647" cy="0"/>
           </a:xfrm>
           <a:prstGeom prst="straightConnector1">
@@ -3687,7 +3751,7 @@
         </p:nvSpPr>
         <p:spPr>
           <a:xfrm>
-            <a:off x="6293923" y="2386938"/>
+            <a:off x="4560125" y="2386938"/>
             <a:ext cx="2710999" cy="369332"/>
           </a:xfrm>
           <a:prstGeom prst="rect">
@@ -3719,7 +3783,7 @@
         </p:nvSpPr>
         <p:spPr>
           <a:xfrm>
-            <a:off x="7101443" y="4833255"/>
+            <a:off x="5367645" y="4833255"/>
             <a:ext cx="2108269" cy="369332"/>
           </a:xfrm>
           <a:prstGeom prst="rect">
@@ -3739,6 +3803,62 @@
                 <a:cs typeface="Arial" panose="020B0604020202020204" pitchFamily="34" charset="0"/>
               </a:rPr>
               <a:t>Our color turns red</a:t>
+            </a:r>
+          </a:p>
+        </p:txBody>
+      </p:sp>
+      <p:pic>
+        <p:nvPicPr>
+          <p:cNvPr id="9" name="Picture 8"/>
+          <p:cNvPicPr>
+            <a:picLocks noChangeAspect="1"/>
+          </p:cNvPicPr>
+          <p:nvPr/>
+        </p:nvPicPr>
+        <p:blipFill>
+          <a:blip r:embed="rId3"/>
+          <a:stretch>
+            <a:fillRect/>
+          </a:stretch>
+        </p:blipFill>
+        <p:spPr>
+          <a:xfrm>
+            <a:off x="7971770" y="998361"/>
+            <a:ext cx="3286125" cy="2257425"/>
+          </a:xfrm>
+          <a:prstGeom prst="rect">
+            <a:avLst/>
+          </a:prstGeom>
+        </p:spPr>
+      </p:pic>
+      <p:sp>
+        <p:nvSpPr>
+          <p:cNvPr id="10" name="Rectangle 9"/>
+          <p:cNvSpPr/>
+          <p:nvPr/>
+        </p:nvSpPr>
+        <p:spPr>
+          <a:xfrm>
+            <a:off x="5320859" y="6575959"/>
+            <a:ext cx="8880048" cy="292388"/>
+          </a:xfrm>
+          <a:prstGeom prst="rect">
+            <a:avLst/>
+          </a:prstGeom>
+        </p:spPr>
+        <p:txBody>
+          <a:bodyPr wrap="square">
+            <a:spAutoFit/>
+          </a:bodyPr>
+          <a:lstStyle/>
+          <a:p>
+            <a:r>
+              <a:rPr lang="en-US" sz="1300" dirty="0">
+                <a:solidFill>
+                  <a:srgbClr val="FF0000"/>
+                </a:solidFill>
+              </a:rPr>
+              <a:t>https://github.com/afodor/WekaExamples/blob/master/src/examples/TestClassify.java</a:t>
             </a:r>
           </a:p>
         </p:txBody>
@@ -3829,6 +3949,38 @@
           </a:p>
         </p:txBody>
       </p:sp>
+      <p:sp>
+        <p:nvSpPr>
+          <p:cNvPr id="4" name="Rectangle 3"/>
+          <p:cNvSpPr/>
+          <p:nvPr/>
+        </p:nvSpPr>
+        <p:spPr>
+          <a:xfrm>
+            <a:off x="5320859" y="6575959"/>
+            <a:ext cx="8880048" cy="292388"/>
+          </a:xfrm>
+          <a:prstGeom prst="rect">
+            <a:avLst/>
+          </a:prstGeom>
+        </p:spPr>
+        <p:txBody>
+          <a:bodyPr wrap="square">
+            <a:spAutoFit/>
+          </a:bodyPr>
+          <a:lstStyle/>
+          <a:p>
+            <a:r>
+              <a:rPr lang="en-US" sz="1300" dirty="0">
+                <a:solidFill>
+                  <a:srgbClr val="FF0000"/>
+                </a:solidFill>
+              </a:rPr>
+              <a:t>https://github.com/afodor/WekaExamples/blob/master/src/examples/TestClassify.java</a:t>
+            </a:r>
+          </a:p>
+        </p:txBody>
+      </p:sp>
     </p:spTree>
     <p:extLst>
       <p:ext uri="{BB962C8B-B14F-4D97-AF65-F5344CB8AC3E}">
@@ -3875,7 +4027,7 @@
         </p:blipFill>
         <p:spPr>
           <a:xfrm>
-            <a:off x="1820882" y="348280"/>
+            <a:off x="573975" y="467033"/>
             <a:ext cx="7480620" cy="5815013"/>
           </a:xfrm>
           <a:prstGeom prst="rect">
@@ -3883,10 +4035,716 @@
           </a:prstGeom>
         </p:spPr>
       </p:pic>
+      <p:cxnSp>
+        <p:nvCxnSpPr>
+          <p:cNvPr id="4" name="Straight Arrow Connector 3"/>
+          <p:cNvCxnSpPr/>
+          <p:nvPr/>
+        </p:nvCxnSpPr>
+        <p:spPr>
+          <a:xfrm flipH="1">
+            <a:off x="4096987" y="1983179"/>
+            <a:ext cx="1140031" cy="23751"/>
+          </a:xfrm>
+          <a:prstGeom prst="straightConnector1">
+            <a:avLst/>
+          </a:prstGeom>
+          <a:ln>
+            <a:tailEnd type="triangle"/>
+          </a:ln>
+        </p:spPr>
+        <p:style>
+          <a:lnRef idx="1">
+            <a:schemeClr val="accent1"/>
+          </a:lnRef>
+          <a:fillRef idx="0">
+            <a:schemeClr val="accent1"/>
+          </a:fillRef>
+          <a:effectRef idx="0">
+            <a:schemeClr val="accent1"/>
+          </a:effectRef>
+          <a:fontRef idx="minor">
+            <a:schemeClr val="tx1"/>
+          </a:fontRef>
+        </p:style>
+      </p:cxnSp>
+      <p:sp>
+        <p:nvSpPr>
+          <p:cNvPr id="5" name="TextBox 4"/>
+          <p:cNvSpPr txBox="1"/>
+          <p:nvPr/>
+        </p:nvSpPr>
+        <p:spPr>
+          <a:xfrm>
+            <a:off x="5379524" y="1793174"/>
+            <a:ext cx="5143396" cy="369332"/>
+          </a:xfrm>
+          <a:prstGeom prst="rect">
+            <a:avLst/>
+          </a:prstGeom>
+          <a:noFill/>
+        </p:spPr>
+        <p:txBody>
+          <a:bodyPr wrap="none" rtlCol="0">
+            <a:spAutoFit/>
+          </a:bodyPr>
+          <a:lstStyle/>
+          <a:p>
+            <a:r>
+              <a:rPr lang="en-US" dirty="0">
+                <a:latin typeface="Arial" panose="020B0604020202020204" pitchFamily="34" charset="0"/>
+                <a:cs typeface="Arial" panose="020B0604020202020204" pitchFamily="34" charset="0"/>
+              </a:rPr>
+              <a:t>We can easily do this for multiple permutations…</a:t>
+            </a:r>
+          </a:p>
+        </p:txBody>
+      </p:sp>
+      <p:sp>
+        <p:nvSpPr>
+          <p:cNvPr id="6" name="Rectangle 5"/>
+          <p:cNvSpPr/>
+          <p:nvPr/>
+        </p:nvSpPr>
+        <p:spPr>
+          <a:xfrm>
+            <a:off x="5320859" y="6575959"/>
+            <a:ext cx="8880048" cy="292388"/>
+          </a:xfrm>
+          <a:prstGeom prst="rect">
+            <a:avLst/>
+          </a:prstGeom>
+        </p:spPr>
+        <p:txBody>
+          <a:bodyPr wrap="square">
+            <a:spAutoFit/>
+          </a:bodyPr>
+          <a:lstStyle/>
+          <a:p>
+            <a:r>
+              <a:rPr lang="en-US" sz="1300" dirty="0">
+                <a:solidFill>
+                  <a:srgbClr val="FF0000"/>
+                </a:solidFill>
+              </a:rPr>
+              <a:t>https://github.com/afodor/WekaExamples/blob/master/src/examples/TestClassify.java</a:t>
+            </a:r>
+          </a:p>
+        </p:txBody>
+      </p:sp>
     </p:spTree>
     <p:extLst>
       <p:ext uri="{BB962C8B-B14F-4D97-AF65-F5344CB8AC3E}">
         <p14:creationId xmlns:p14="http://schemas.microsoft.com/office/powerpoint/2010/main" val="4046732664"/>
+      </p:ext>
+    </p:extLst>
+  </p:cSld>
+  <p:clrMapOvr>
+    <a:masterClrMapping/>
+  </p:clrMapOvr>
+</p:sld>
+</file>
+
+<file path=ppt/slides/slide17.xml><?xml version="1.0" encoding="utf-8"?>
+<p:sld xmlns:a="http://schemas.openxmlformats.org/drawingml/2006/main" xmlns:r="http://schemas.openxmlformats.org/officeDocument/2006/relationships" xmlns:p="http://schemas.openxmlformats.org/presentationml/2006/main">
+  <p:cSld>
+    <p:spTree>
+      <p:nvGrpSpPr>
+        <p:cNvPr id="1" name=""/>
+        <p:cNvGrpSpPr/>
+        <p:nvPr/>
+      </p:nvGrpSpPr>
+      <p:grpSpPr>
+        <a:xfrm>
+          <a:off x="0" y="0"/>
+          <a:ext cx="0" cy="0"/>
+          <a:chOff x="0" y="0"/>
+          <a:chExt cx="0" cy="0"/>
+        </a:xfrm>
+      </p:grpSpPr>
+      <p:pic>
+        <p:nvPicPr>
+          <p:cNvPr id="2" name="Picture 1"/>
+          <p:cNvPicPr>
+            <a:picLocks noChangeAspect="1"/>
+          </p:cNvPicPr>
+          <p:nvPr/>
+        </p:nvPicPr>
+        <p:blipFill>
+          <a:blip r:embed="rId2"/>
+          <a:stretch>
+            <a:fillRect/>
+          </a:stretch>
+        </p:blipFill>
+        <p:spPr>
+          <a:xfrm>
+            <a:off x="8091548" y="3796520"/>
+            <a:ext cx="3276600" cy="2305050"/>
+          </a:xfrm>
+          <a:prstGeom prst="rect">
+            <a:avLst/>
+          </a:prstGeom>
+        </p:spPr>
+      </p:pic>
+      <p:pic>
+        <p:nvPicPr>
+          <p:cNvPr id="3" name="Picture 2"/>
+          <p:cNvPicPr>
+            <a:picLocks noChangeAspect="1"/>
+          </p:cNvPicPr>
+          <p:nvPr/>
+        </p:nvPicPr>
+        <p:blipFill>
+          <a:blip r:embed="rId3"/>
+          <a:stretch>
+            <a:fillRect/>
+          </a:stretch>
+        </p:blipFill>
+        <p:spPr>
+          <a:xfrm>
+            <a:off x="8624948" y="6259723"/>
+            <a:ext cx="2209800" cy="276225"/>
+          </a:xfrm>
+          <a:prstGeom prst="rect">
+            <a:avLst/>
+          </a:prstGeom>
+        </p:spPr>
+      </p:pic>
+      <p:pic>
+        <p:nvPicPr>
+          <p:cNvPr id="4" name="Picture 3"/>
+          <p:cNvPicPr>
+            <a:picLocks noChangeAspect="1"/>
+          </p:cNvPicPr>
+          <p:nvPr/>
+        </p:nvPicPr>
+        <p:blipFill>
+          <a:blip r:embed="rId4"/>
+          <a:stretch>
+            <a:fillRect/>
+          </a:stretch>
+        </p:blipFill>
+        <p:spPr>
+          <a:xfrm>
+            <a:off x="209054" y="615416"/>
+            <a:ext cx="8820150" cy="3095625"/>
+          </a:xfrm>
+          <a:prstGeom prst="rect">
+            <a:avLst/>
+          </a:prstGeom>
+        </p:spPr>
+      </p:pic>
+      <p:sp>
+        <p:nvSpPr>
+          <p:cNvPr id="5" name="Rectangle 4"/>
+          <p:cNvSpPr/>
+          <p:nvPr/>
+        </p:nvSpPr>
+        <p:spPr>
+          <a:xfrm>
+            <a:off x="5601191" y="6489902"/>
+            <a:ext cx="6096000" cy="276999"/>
+          </a:xfrm>
+          <a:prstGeom prst="rect">
+            <a:avLst/>
+          </a:prstGeom>
+        </p:spPr>
+        <p:txBody>
+          <a:bodyPr>
+            <a:spAutoFit/>
+          </a:bodyPr>
+          <a:lstStyle/>
+          <a:p>
+            <a:r>
+              <a:rPr lang="en-US" sz="1200" dirty="0"/>
+              <a:t>https://github.com/afodor/WekaExamples/blob/master/src/examples/RunOneROCCurve.java</a:t>
+            </a:r>
+          </a:p>
+        </p:txBody>
+      </p:sp>
+    </p:spTree>
+    <p:extLst>
+      <p:ext uri="{BB962C8B-B14F-4D97-AF65-F5344CB8AC3E}">
+        <p14:creationId xmlns:p14="http://schemas.microsoft.com/office/powerpoint/2010/main" val="2532425023"/>
+      </p:ext>
+    </p:extLst>
+  </p:cSld>
+  <p:clrMapOvr>
+    <a:masterClrMapping/>
+  </p:clrMapOvr>
+</p:sld>
+</file>
+
+<file path=ppt/slides/slide18.xml><?xml version="1.0" encoding="utf-8"?>
+<p:sld xmlns:a="http://schemas.openxmlformats.org/drawingml/2006/main" xmlns:r="http://schemas.openxmlformats.org/officeDocument/2006/relationships" xmlns:p="http://schemas.openxmlformats.org/presentationml/2006/main">
+  <p:cSld>
+    <p:spTree>
+      <p:nvGrpSpPr>
+        <p:cNvPr id="1" name=""/>
+        <p:cNvGrpSpPr/>
+        <p:nvPr/>
+      </p:nvGrpSpPr>
+      <p:grpSpPr>
+        <a:xfrm>
+          <a:off x="0" y="0"/>
+          <a:ext cx="0" cy="0"/>
+          <a:chOff x="0" y="0"/>
+          <a:chExt cx="0" cy="0"/>
+        </a:xfrm>
+      </p:grpSpPr>
+      <p:sp>
+        <p:nvSpPr>
+          <p:cNvPr id="2" name="TextBox 1"/>
+          <p:cNvSpPr txBox="1"/>
+          <p:nvPr/>
+        </p:nvSpPr>
+        <p:spPr>
+          <a:xfrm>
+            <a:off x="676894" y="213756"/>
+            <a:ext cx="5429692" cy="369332"/>
+          </a:xfrm>
+          <a:prstGeom prst="rect">
+            <a:avLst/>
+          </a:prstGeom>
+          <a:noFill/>
+        </p:spPr>
+        <p:txBody>
+          <a:bodyPr wrap="none" rtlCol="0">
+            <a:spAutoFit/>
+          </a:bodyPr>
+          <a:lstStyle/>
+          <a:p>
+            <a:r>
+              <a:rPr lang="en-US" dirty="0">
+                <a:latin typeface="Arial" panose="020B0604020202020204" pitchFamily="34" charset="0"/>
+                <a:cs typeface="Arial" panose="020B0604020202020204" pitchFamily="34" charset="0"/>
+              </a:rPr>
+              <a:t>Multi-threaded application seems straight-forward…</a:t>
+            </a:r>
+          </a:p>
+        </p:txBody>
+      </p:sp>
+      <p:pic>
+        <p:nvPicPr>
+          <p:cNvPr id="3" name="Picture 2"/>
+          <p:cNvPicPr>
+            <a:picLocks noChangeAspect="1"/>
+          </p:cNvPicPr>
+          <p:nvPr/>
+        </p:nvPicPr>
+        <p:blipFill>
+          <a:blip r:embed="rId2"/>
+          <a:stretch>
+            <a:fillRect/>
+          </a:stretch>
+        </p:blipFill>
+        <p:spPr>
+          <a:xfrm>
+            <a:off x="7818540" y="398422"/>
+            <a:ext cx="3181350" cy="2219325"/>
+          </a:xfrm>
+          <a:prstGeom prst="rect">
+            <a:avLst/>
+          </a:prstGeom>
+        </p:spPr>
+      </p:pic>
+      <p:pic>
+        <p:nvPicPr>
+          <p:cNvPr id="4" name="Picture 3"/>
+          <p:cNvPicPr>
+            <a:picLocks noChangeAspect="1"/>
+          </p:cNvPicPr>
+          <p:nvPr/>
+        </p:nvPicPr>
+        <p:blipFill>
+          <a:blip r:embed="rId3"/>
+          <a:stretch>
+            <a:fillRect/>
+          </a:stretch>
+        </p:blipFill>
+        <p:spPr>
+          <a:xfrm>
+            <a:off x="8185252" y="2703048"/>
+            <a:ext cx="2447925" cy="323850"/>
+          </a:xfrm>
+          <a:prstGeom prst="rect">
+            <a:avLst/>
+          </a:prstGeom>
+        </p:spPr>
+      </p:pic>
+      <p:pic>
+        <p:nvPicPr>
+          <p:cNvPr id="5" name="Picture 4"/>
+          <p:cNvPicPr>
+            <a:picLocks noChangeAspect="1"/>
+          </p:cNvPicPr>
+          <p:nvPr/>
+        </p:nvPicPr>
+        <p:blipFill>
+          <a:blip r:embed="rId4"/>
+          <a:stretch>
+            <a:fillRect/>
+          </a:stretch>
+        </p:blipFill>
+        <p:spPr>
+          <a:xfrm>
+            <a:off x="274739" y="3112199"/>
+            <a:ext cx="9134475" cy="3562350"/>
+          </a:xfrm>
+          <a:prstGeom prst="rect">
+            <a:avLst/>
+          </a:prstGeom>
+        </p:spPr>
+      </p:pic>
+      <p:sp>
+        <p:nvSpPr>
+          <p:cNvPr id="6" name="Rectangle 5"/>
+          <p:cNvSpPr/>
+          <p:nvPr/>
+        </p:nvSpPr>
+        <p:spPr>
+          <a:xfrm>
+            <a:off x="5601191" y="6489902"/>
+            <a:ext cx="6096000" cy="276999"/>
+          </a:xfrm>
+          <a:prstGeom prst="rect">
+            <a:avLst/>
+          </a:prstGeom>
+        </p:spPr>
+        <p:txBody>
+          <a:bodyPr>
+            <a:spAutoFit/>
+          </a:bodyPr>
+          <a:lstStyle/>
+          <a:p>
+            <a:r>
+              <a:rPr lang="en-US" sz="1200" dirty="0"/>
+              <a:t>https://github.com/afodor/WekaExamples/blob/master/src/examples/RunOneROCCurve.java</a:t>
+            </a:r>
+          </a:p>
+        </p:txBody>
+      </p:sp>
+      <p:sp>
+        <p:nvSpPr>
+          <p:cNvPr id="7" name="TextBox 6"/>
+          <p:cNvSpPr txBox="1"/>
+          <p:nvPr/>
+        </p:nvSpPr>
+        <p:spPr>
+          <a:xfrm>
+            <a:off x="1056904" y="819397"/>
+            <a:ext cx="4851777" cy="369332"/>
+          </a:xfrm>
+          <a:prstGeom prst="rect">
+            <a:avLst/>
+          </a:prstGeom>
+          <a:noFill/>
+        </p:spPr>
+        <p:txBody>
+          <a:bodyPr wrap="none" rtlCol="0">
+            <a:spAutoFit/>
+          </a:bodyPr>
+          <a:lstStyle/>
+          <a:p>
+            <a:r>
+              <a:rPr lang="en-US" dirty="0"/>
+              <a:t>A very robust 7.87 fold speedup on an 8 core box!</a:t>
+            </a:r>
+          </a:p>
+        </p:txBody>
+      </p:sp>
+    </p:spTree>
+    <p:extLst>
+      <p:ext uri="{BB962C8B-B14F-4D97-AF65-F5344CB8AC3E}">
+        <p14:creationId xmlns:p14="http://schemas.microsoft.com/office/powerpoint/2010/main" val="1309905470"/>
+      </p:ext>
+    </p:extLst>
+  </p:cSld>
+  <p:clrMapOvr>
+    <a:masterClrMapping/>
+  </p:clrMapOvr>
+</p:sld>
+</file>
+
+<file path=ppt/slides/slide19.xml><?xml version="1.0" encoding="utf-8"?>
+<p:sld xmlns:a="http://schemas.openxmlformats.org/drawingml/2006/main" xmlns:r="http://schemas.openxmlformats.org/officeDocument/2006/relationships" xmlns:p="http://schemas.openxmlformats.org/presentationml/2006/main">
+  <p:cSld>
+    <p:spTree>
+      <p:nvGrpSpPr>
+        <p:cNvPr id="1" name=""/>
+        <p:cNvGrpSpPr/>
+        <p:nvPr/>
+      </p:nvGrpSpPr>
+      <p:grpSpPr>
+        <a:xfrm>
+          <a:off x="0" y="0"/>
+          <a:ext cx="0" cy="0"/>
+          <a:chOff x="0" y="0"/>
+          <a:chExt cx="0" cy="0"/>
+        </a:xfrm>
+      </p:grpSpPr>
+      <p:sp>
+        <p:nvSpPr>
+          <p:cNvPr id="2" name="TextBox 1"/>
+          <p:cNvSpPr txBox="1"/>
+          <p:nvPr/>
+        </p:nvSpPr>
+        <p:spPr>
+          <a:xfrm>
+            <a:off x="-35627" y="-59377"/>
+            <a:ext cx="11555856" cy="338554"/>
+          </a:xfrm>
+          <a:prstGeom prst="rect">
+            <a:avLst/>
+          </a:prstGeom>
+          <a:noFill/>
+        </p:spPr>
+        <p:txBody>
+          <a:bodyPr wrap="none" rtlCol="0">
+            <a:spAutoFit/>
+          </a:bodyPr>
+          <a:lstStyle/>
+          <a:p>
+            <a:r>
+              <a:rPr lang="en-US" sz="1600" dirty="0">
+                <a:latin typeface="Arial" panose="020B0604020202020204" pitchFamily="34" charset="0"/>
+                <a:cs typeface="Arial" panose="020B0604020202020204" pitchFamily="34" charset="0"/>
+              </a:rPr>
+              <a:t>How do we make this multi-threaded?  Start (as usual) by making a Worker class. Not much will be shared between workers..</a:t>
+            </a:r>
+          </a:p>
+        </p:txBody>
+      </p:sp>
+      <p:pic>
+        <p:nvPicPr>
+          <p:cNvPr id="3" name="Picture 2"/>
+          <p:cNvPicPr>
+            <a:picLocks noChangeAspect="1"/>
+          </p:cNvPicPr>
+          <p:nvPr/>
+        </p:nvPicPr>
+        <p:blipFill>
+          <a:blip r:embed="rId2"/>
+          <a:stretch>
+            <a:fillRect/>
+          </a:stretch>
+        </p:blipFill>
+        <p:spPr>
+          <a:xfrm>
+            <a:off x="204848" y="279177"/>
+            <a:ext cx="8610600" cy="3448050"/>
+          </a:xfrm>
+          <a:prstGeom prst="rect">
+            <a:avLst/>
+          </a:prstGeom>
+        </p:spPr>
+      </p:pic>
+      <p:pic>
+        <p:nvPicPr>
+          <p:cNvPr id="4" name="Picture 3"/>
+          <p:cNvPicPr>
+            <a:picLocks noChangeAspect="1"/>
+          </p:cNvPicPr>
+          <p:nvPr/>
+        </p:nvPicPr>
+        <p:blipFill>
+          <a:blip r:embed="rId3"/>
+          <a:stretch>
+            <a:fillRect/>
+          </a:stretch>
+        </p:blipFill>
+        <p:spPr>
+          <a:xfrm>
+            <a:off x="5754275" y="2288379"/>
+            <a:ext cx="4897891" cy="4262225"/>
+          </a:xfrm>
+          <a:prstGeom prst="rect">
+            <a:avLst/>
+          </a:prstGeom>
+        </p:spPr>
+      </p:pic>
+      <p:cxnSp>
+        <p:nvCxnSpPr>
+          <p:cNvPr id="6" name="Straight Connector 5"/>
+          <p:cNvCxnSpPr/>
+          <p:nvPr/>
+        </p:nvCxnSpPr>
+        <p:spPr>
+          <a:xfrm>
+            <a:off x="5438899" y="2208810"/>
+            <a:ext cx="0" cy="4476998"/>
+          </a:xfrm>
+          <a:prstGeom prst="line">
+            <a:avLst/>
+          </a:prstGeom>
+        </p:spPr>
+        <p:style>
+          <a:lnRef idx="1">
+            <a:schemeClr val="accent1"/>
+          </a:lnRef>
+          <a:fillRef idx="0">
+            <a:schemeClr val="accent1"/>
+          </a:fillRef>
+          <a:effectRef idx="0">
+            <a:schemeClr val="accent1"/>
+          </a:effectRef>
+          <a:fontRef idx="minor">
+            <a:schemeClr val="tx1"/>
+          </a:fontRef>
+        </p:style>
+      </p:cxnSp>
+      <p:cxnSp>
+        <p:nvCxnSpPr>
+          <p:cNvPr id="8" name="Straight Connector 7"/>
+          <p:cNvCxnSpPr/>
+          <p:nvPr/>
+        </p:nvCxnSpPr>
+        <p:spPr>
+          <a:xfrm>
+            <a:off x="5474525" y="2196935"/>
+            <a:ext cx="6187044" cy="0"/>
+          </a:xfrm>
+          <a:prstGeom prst="line">
+            <a:avLst/>
+          </a:prstGeom>
+        </p:spPr>
+        <p:style>
+          <a:lnRef idx="1">
+            <a:schemeClr val="accent1"/>
+          </a:lnRef>
+          <a:fillRef idx="0">
+            <a:schemeClr val="accent1"/>
+          </a:fillRef>
+          <a:effectRef idx="0">
+            <a:schemeClr val="accent1"/>
+          </a:effectRef>
+          <a:fontRef idx="minor">
+            <a:schemeClr val="tx1"/>
+          </a:fontRef>
+        </p:style>
+      </p:cxnSp>
+      <p:cxnSp>
+        <p:nvCxnSpPr>
+          <p:cNvPr id="12" name="Straight Arrow Connector 11"/>
+          <p:cNvCxnSpPr/>
+          <p:nvPr/>
+        </p:nvCxnSpPr>
+        <p:spPr>
+          <a:xfrm>
+            <a:off x="4510148" y="4892634"/>
+            <a:ext cx="2092533" cy="59376"/>
+          </a:xfrm>
+          <a:prstGeom prst="straightConnector1">
+            <a:avLst/>
+          </a:prstGeom>
+          <a:ln>
+            <a:tailEnd type="triangle"/>
+          </a:ln>
+        </p:spPr>
+        <p:style>
+          <a:lnRef idx="1">
+            <a:schemeClr val="accent1"/>
+          </a:lnRef>
+          <a:fillRef idx="0">
+            <a:schemeClr val="accent1"/>
+          </a:fillRef>
+          <a:effectRef idx="0">
+            <a:schemeClr val="accent1"/>
+          </a:effectRef>
+          <a:fontRef idx="minor">
+            <a:schemeClr val="tx1"/>
+          </a:fontRef>
+        </p:style>
+      </p:cxnSp>
+      <p:sp>
+        <p:nvSpPr>
+          <p:cNvPr id="13" name="TextBox 12"/>
+          <p:cNvSpPr txBox="1"/>
+          <p:nvPr/>
+        </p:nvSpPr>
+        <p:spPr>
+          <a:xfrm>
+            <a:off x="1769423" y="4447309"/>
+            <a:ext cx="3350917" cy="1477328"/>
+          </a:xfrm>
+          <a:prstGeom prst="rect">
+            <a:avLst/>
+          </a:prstGeom>
+          <a:noFill/>
+        </p:spPr>
+        <p:txBody>
+          <a:bodyPr wrap="none" rtlCol="0">
+            <a:spAutoFit/>
+          </a:bodyPr>
+          <a:lstStyle/>
+          <a:p>
+            <a:r>
+              <a:rPr lang="en-US" dirty="0"/>
+              <a:t>Remember that everything here </a:t>
+            </a:r>
+          </a:p>
+          <a:p>
+            <a:r>
+              <a:rPr lang="en-US" dirty="0"/>
+              <a:t>is stack-confined up until the </a:t>
+            </a:r>
+          </a:p>
+          <a:p>
+            <a:r>
+              <a:rPr lang="en-US" dirty="0"/>
+              <a:t>drawing, which is confined to the </a:t>
+            </a:r>
+          </a:p>
+          <a:p>
+            <a:r>
+              <a:rPr lang="en-US" dirty="0"/>
+              <a:t>AWT thread and hence is single-</a:t>
+            </a:r>
+          </a:p>
+          <a:p>
+            <a:r>
+              <a:rPr lang="en-US" dirty="0"/>
+              <a:t>threaded!</a:t>
+            </a:r>
+          </a:p>
+        </p:txBody>
+      </p:sp>
+      <p:sp>
+        <p:nvSpPr>
+          <p:cNvPr id="14" name="Rectangle 13"/>
+          <p:cNvSpPr/>
+          <p:nvPr/>
+        </p:nvSpPr>
+        <p:spPr>
+          <a:xfrm>
+            <a:off x="5320859" y="6575959"/>
+            <a:ext cx="8880048" cy="292388"/>
+          </a:xfrm>
+          <a:prstGeom prst="rect">
+            <a:avLst/>
+          </a:prstGeom>
+        </p:spPr>
+        <p:txBody>
+          <a:bodyPr wrap="square">
+            <a:spAutoFit/>
+          </a:bodyPr>
+          <a:lstStyle/>
+          <a:p>
+            <a:r>
+              <a:rPr lang="en-US" sz="1300" dirty="0">
+                <a:solidFill>
+                  <a:srgbClr val="FF0000"/>
+                </a:solidFill>
+              </a:rPr>
+              <a:t>https://github.com/afodor/WekaExamples/blob/master/src/examples/TestClassify.java</a:t>
+            </a:r>
+          </a:p>
+        </p:txBody>
+      </p:sp>
+    </p:spTree>
+    <p:extLst>
+      <p:ext uri="{BB962C8B-B14F-4D97-AF65-F5344CB8AC3E}">
+        <p14:creationId xmlns:p14="http://schemas.microsoft.com/office/powerpoint/2010/main" val="194292275"/>
       </p:ext>
     </p:extLst>
   </p:cSld>
@@ -4494,6 +5352,124 @@
     <p:extLst>
       <p:ext uri="{BB962C8B-B14F-4D97-AF65-F5344CB8AC3E}">
         <p14:creationId xmlns:p14="http://schemas.microsoft.com/office/powerpoint/2010/main" val="2252819287"/>
+      </p:ext>
+    </p:extLst>
+  </p:cSld>
+  <p:clrMapOvr>
+    <a:masterClrMapping/>
+  </p:clrMapOvr>
+</p:sld>
+</file>
+
+<file path=ppt/slides/slide20.xml><?xml version="1.0" encoding="utf-8"?>
+<p:sld xmlns:a="http://schemas.openxmlformats.org/drawingml/2006/main" xmlns:r="http://schemas.openxmlformats.org/officeDocument/2006/relationships" xmlns:p="http://schemas.openxmlformats.org/presentationml/2006/main">
+  <p:cSld>
+    <p:spTree>
+      <p:nvGrpSpPr>
+        <p:cNvPr id="1" name=""/>
+        <p:cNvGrpSpPr/>
+        <p:nvPr/>
+      </p:nvGrpSpPr>
+      <p:grpSpPr>
+        <a:xfrm>
+          <a:off x="0" y="0"/>
+          <a:ext cx="0" cy="0"/>
+          <a:chOff x="0" y="0"/>
+          <a:chExt cx="0" cy="0"/>
+        </a:xfrm>
+      </p:grpSpPr>
+      <p:pic>
+        <p:nvPicPr>
+          <p:cNvPr id="2" name="Picture 1"/>
+          <p:cNvPicPr>
+            <a:picLocks noChangeAspect="1"/>
+          </p:cNvPicPr>
+          <p:nvPr/>
+        </p:nvPicPr>
+        <p:blipFill>
+          <a:blip r:embed="rId2"/>
+          <a:stretch>
+            <a:fillRect/>
+          </a:stretch>
+        </p:blipFill>
+        <p:spPr>
+          <a:xfrm>
+            <a:off x="1397144" y="1060799"/>
+            <a:ext cx="9156172" cy="4378099"/>
+          </a:xfrm>
+          <a:prstGeom prst="rect">
+            <a:avLst/>
+          </a:prstGeom>
+        </p:spPr>
+      </p:pic>
+      <p:sp>
+        <p:nvSpPr>
+          <p:cNvPr id="4" name="Rectangle 3"/>
+          <p:cNvSpPr/>
+          <p:nvPr/>
+        </p:nvSpPr>
+        <p:spPr>
+          <a:xfrm>
+            <a:off x="5320859" y="6575959"/>
+            <a:ext cx="8880048" cy="292388"/>
+          </a:xfrm>
+          <a:prstGeom prst="rect">
+            <a:avLst/>
+          </a:prstGeom>
+        </p:spPr>
+        <p:txBody>
+          <a:bodyPr wrap="square">
+            <a:spAutoFit/>
+          </a:bodyPr>
+          <a:lstStyle/>
+          <a:p>
+            <a:r>
+              <a:rPr lang="en-US" sz="1300" dirty="0">
+                <a:solidFill>
+                  <a:srgbClr val="FF0000"/>
+                </a:solidFill>
+              </a:rPr>
+              <a:t>https://github.com/afodor/WekaExamples/blob/master/src/examples/TestClassify.java</a:t>
+            </a:r>
+          </a:p>
+        </p:txBody>
+      </p:sp>
+      <p:sp>
+        <p:nvSpPr>
+          <p:cNvPr id="5" name="TextBox 4"/>
+          <p:cNvSpPr txBox="1"/>
+          <p:nvPr/>
+        </p:nvSpPr>
+        <p:spPr>
+          <a:xfrm>
+            <a:off x="629392" y="451263"/>
+            <a:ext cx="10520829" cy="369332"/>
+          </a:xfrm>
+          <a:prstGeom prst="rect">
+            <a:avLst/>
+          </a:prstGeom>
+          <a:noFill/>
+        </p:spPr>
+        <p:txBody>
+          <a:bodyPr wrap="none" rtlCol="0">
+            <a:spAutoFit/>
+          </a:bodyPr>
+          <a:lstStyle/>
+          <a:p>
+            <a:r>
+              <a:rPr lang="en-US" dirty="0">
+                <a:latin typeface="Arial" panose="020B0604020202020204" pitchFamily="34" charset="0"/>
+                <a:cs typeface="Arial" panose="020B0604020202020204" pitchFamily="34" charset="0"/>
+              </a:rPr>
+              <a:t>The semaphore remains a very easy to implement and flexible way to split work up between threads..</a:t>
+            </a:r>
+          </a:p>
+        </p:txBody>
+      </p:sp>
+    </p:spTree>
+    <p:extLst>
+      <p:ext uri="{BB962C8B-B14F-4D97-AF65-F5344CB8AC3E}">
+        <p14:creationId xmlns:p14="http://schemas.microsoft.com/office/powerpoint/2010/main" val="1217630876"/>
       </p:ext>
     </p:extLst>
   </p:cSld>
@@ -6380,6 +7356,38 @@
             <a:r>
               <a:rPr lang="en-US" dirty="0"/>
               <a:t>Make sure AWT thread has full visibility</a:t>
+            </a:r>
+          </a:p>
+        </p:txBody>
+      </p:sp>
+      <p:sp>
+        <p:nvSpPr>
+          <p:cNvPr id="17" name="Rectangle 16"/>
+          <p:cNvSpPr/>
+          <p:nvPr/>
+        </p:nvSpPr>
+        <p:spPr>
+          <a:xfrm>
+            <a:off x="5320859" y="6575959"/>
+            <a:ext cx="8880048" cy="292388"/>
+          </a:xfrm>
+          <a:prstGeom prst="rect">
+            <a:avLst/>
+          </a:prstGeom>
+        </p:spPr>
+        <p:txBody>
+          <a:bodyPr wrap="square">
+            <a:spAutoFit/>
+          </a:bodyPr>
+          <a:lstStyle/>
+          <a:p>
+            <a:r>
+              <a:rPr lang="en-US" sz="1300" dirty="0">
+                <a:solidFill>
+                  <a:srgbClr val="FF0000"/>
+                </a:solidFill>
+              </a:rPr>
+              <a:t>https://github.com/afodor/WekaExamples/blob/master/src/examples/TestClassify.java</a:t>
             </a:r>
           </a:p>
         </p:txBody>

</xml_diff>

<commit_message>
update AWT thread slide
</commit_message>
<xml_diff>
--- a/classes/prog2016/Prog3-Lecture22.pptx
+++ b/classes/prog2016/Prog3-Lecture22.pptx
@@ -9531,7 +9531,7 @@
       </p:grpSpPr>
       <p:pic>
         <p:nvPicPr>
-          <p:cNvPr id="2" name="Picture 1"/>
+          <p:cNvPr id="4" name="Picture 3"/>
           <p:cNvPicPr>
             <a:picLocks noChangeAspect="1"/>
           </p:cNvPicPr>
@@ -9545,32 +9545,8 @@
         </p:blipFill>
         <p:spPr>
           <a:xfrm>
-            <a:off x="433697" y="448725"/>
-            <a:ext cx="6727124" cy="6321772"/>
-          </a:xfrm>
-          <a:prstGeom prst="rect">
-            <a:avLst/>
-          </a:prstGeom>
-        </p:spPr>
-      </p:pic>
-      <p:pic>
-        <p:nvPicPr>
-          <p:cNvPr id="3" name="Picture 2"/>
-          <p:cNvPicPr>
-            <a:picLocks noChangeAspect="1"/>
-          </p:cNvPicPr>
-          <p:nvPr/>
-        </p:nvPicPr>
-        <p:blipFill>
-          <a:blip r:embed="rId3"/>
-          <a:stretch>
-            <a:fillRect/>
-          </a:stretch>
-        </p:blipFill>
-        <p:spPr>
-          <a:xfrm>
-            <a:off x="433697" y="170087"/>
-            <a:ext cx="6076950" cy="247650"/>
+            <a:off x="307644" y="144325"/>
+            <a:ext cx="5772521" cy="6673936"/>
           </a:xfrm>
           <a:prstGeom prst="rect">
             <a:avLst/>
@@ -9585,7 +9561,7 @@
         </p:nvCxnSpPr>
         <p:spPr>
           <a:xfrm flipH="1">
-            <a:off x="5225143" y="961901"/>
+            <a:off x="4120737" y="795647"/>
             <a:ext cx="1543792" cy="0"/>
           </a:xfrm>
           <a:prstGeom prst="straightConnector1">
@@ -9618,7 +9594,7 @@
         </p:nvCxnSpPr>
         <p:spPr>
           <a:xfrm flipH="1">
-            <a:off x="4821382" y="2719449"/>
+            <a:off x="2778825" y="2719449"/>
             <a:ext cx="1864426" cy="0"/>
           </a:xfrm>
           <a:prstGeom prst="straightConnector1">
@@ -9651,7 +9627,7 @@
         </p:nvSpPr>
         <p:spPr>
           <a:xfrm>
-            <a:off x="5664530" y="1187534"/>
+            <a:off x="4992603" y="1006205"/>
             <a:ext cx="5416868" cy="1477328"/>
           </a:xfrm>
           <a:prstGeom prst="rect">
@@ -9716,7 +9692,7 @@
         </p:nvCxnSpPr>
         <p:spPr>
           <a:xfrm flipH="1">
-            <a:off x="3954483" y="5498276"/>
+            <a:off x="3536866" y="5262280"/>
             <a:ext cx="866899" cy="11875"/>
           </a:xfrm>
           <a:prstGeom prst="straightConnector1">
@@ -9749,7 +9725,7 @@
         </p:nvSpPr>
         <p:spPr>
           <a:xfrm>
-            <a:off x="4904509" y="5343896"/>
+            <a:off x="4381995" y="5070764"/>
             <a:ext cx="5248424" cy="369332"/>
           </a:xfrm>
           <a:prstGeom prst="rect">
@@ -9778,7 +9754,7 @@
         </p:nvCxnSpPr>
         <p:spPr>
           <a:xfrm flipH="1" flipV="1">
-            <a:off x="3313216" y="3348842"/>
+            <a:off x="2778829" y="3503221"/>
             <a:ext cx="641267" cy="11875"/>
           </a:xfrm>
           <a:prstGeom prst="straightConnector1">
@@ -9811,7 +9787,7 @@
         </p:nvSpPr>
         <p:spPr>
           <a:xfrm>
-            <a:off x="4037610" y="3206339"/>
+            <a:off x="3503223" y="3360718"/>
             <a:ext cx="5213222" cy="369332"/>
           </a:xfrm>
           <a:prstGeom prst="rect">
@@ -9840,7 +9816,7 @@
         </p:nvCxnSpPr>
         <p:spPr>
           <a:xfrm flipH="1" flipV="1">
-            <a:off x="4748152" y="5021284"/>
+            <a:off x="3501241" y="4665025"/>
             <a:ext cx="641267" cy="11875"/>
           </a:xfrm>
           <a:prstGeom prst="straightConnector1">
@@ -9873,7 +9849,7 @@
         </p:nvSpPr>
         <p:spPr>
           <a:xfrm>
-            <a:off x="5448796" y="4878781"/>
+            <a:off x="4201885" y="4522522"/>
             <a:ext cx="3873112" cy="369332"/>
           </a:xfrm>
           <a:prstGeom prst="rect">

</xml_diff>

<commit_message>
More complete cross-classifier plus some bug fixes...
</commit_message>
<xml_diff>
--- a/classes/prog2016/Prog3-Lecture22.pptx
+++ b/classes/prog2016/Prog3-Lecture22.pptx
@@ -37,7 +37,13 @@
     <p:sldId id="287" r:id="rId31"/>
     <p:sldId id="288" r:id="rId32"/>
     <p:sldId id="289" r:id="rId33"/>
-    <p:sldId id="290" r:id="rId34"/>
+    <p:sldId id="291" r:id="rId34"/>
+    <p:sldId id="290" r:id="rId35"/>
+    <p:sldId id="292" r:id="rId36"/>
+    <p:sldId id="293" r:id="rId37"/>
+    <p:sldId id="294" r:id="rId38"/>
+    <p:sldId id="295" r:id="rId39"/>
+    <p:sldId id="296" r:id="rId40"/>
   </p:sldIdLst>
   <p:sldSz cx="12192000" cy="6858000"/>
   <p:notesSz cx="6858000" cy="9144000"/>
@@ -273,7 +279,7 @@
           <a:p>
             <a:fld id="{2A29526C-FCA9-4192-994E-C57D3FD5424C}" type="datetimeFigureOut">
               <a:rPr lang="en-US" smtClean="0"/>
-              <a:t>11/24/2016</a:t>
+              <a:t>12/6/2016</a:t>
             </a:fld>
             <a:endParaRPr lang="en-US"/>
           </a:p>
@@ -441,7 +447,7 @@
           <a:p>
             <a:fld id="{2A29526C-FCA9-4192-994E-C57D3FD5424C}" type="datetimeFigureOut">
               <a:rPr lang="en-US" smtClean="0"/>
-              <a:t>11/24/2016</a:t>
+              <a:t>12/6/2016</a:t>
             </a:fld>
             <a:endParaRPr lang="en-US"/>
           </a:p>
@@ -619,7 +625,7 @@
           <a:p>
             <a:fld id="{2A29526C-FCA9-4192-994E-C57D3FD5424C}" type="datetimeFigureOut">
               <a:rPr lang="en-US" smtClean="0"/>
-              <a:t>11/24/2016</a:t>
+              <a:t>12/6/2016</a:t>
             </a:fld>
             <a:endParaRPr lang="en-US"/>
           </a:p>
@@ -787,7 +793,7 @@
           <a:p>
             <a:fld id="{2A29526C-FCA9-4192-994E-C57D3FD5424C}" type="datetimeFigureOut">
               <a:rPr lang="en-US" smtClean="0"/>
-              <a:t>11/24/2016</a:t>
+              <a:t>12/6/2016</a:t>
             </a:fld>
             <a:endParaRPr lang="en-US"/>
           </a:p>
@@ -1032,7 +1038,7 @@
           <a:p>
             <a:fld id="{2A29526C-FCA9-4192-994E-C57D3FD5424C}" type="datetimeFigureOut">
               <a:rPr lang="en-US" smtClean="0"/>
-              <a:t>11/24/2016</a:t>
+              <a:t>12/6/2016</a:t>
             </a:fld>
             <a:endParaRPr lang="en-US"/>
           </a:p>
@@ -1261,7 +1267,7 @@
           <a:p>
             <a:fld id="{2A29526C-FCA9-4192-994E-C57D3FD5424C}" type="datetimeFigureOut">
               <a:rPr lang="en-US" smtClean="0"/>
-              <a:t>11/24/2016</a:t>
+              <a:t>12/6/2016</a:t>
             </a:fld>
             <a:endParaRPr lang="en-US"/>
           </a:p>
@@ -1625,7 +1631,7 @@
           <a:p>
             <a:fld id="{2A29526C-FCA9-4192-994E-C57D3FD5424C}" type="datetimeFigureOut">
               <a:rPr lang="en-US" smtClean="0"/>
-              <a:t>11/24/2016</a:t>
+              <a:t>12/6/2016</a:t>
             </a:fld>
             <a:endParaRPr lang="en-US"/>
           </a:p>
@@ -1742,7 +1748,7 @@
           <a:p>
             <a:fld id="{2A29526C-FCA9-4192-994E-C57D3FD5424C}" type="datetimeFigureOut">
               <a:rPr lang="en-US" smtClean="0"/>
-              <a:t>11/24/2016</a:t>
+              <a:t>12/6/2016</a:t>
             </a:fld>
             <a:endParaRPr lang="en-US"/>
           </a:p>
@@ -1837,7 +1843,7 @@
           <a:p>
             <a:fld id="{2A29526C-FCA9-4192-994E-C57D3FD5424C}" type="datetimeFigureOut">
               <a:rPr lang="en-US" smtClean="0"/>
-              <a:t>11/24/2016</a:t>
+              <a:t>12/6/2016</a:t>
             </a:fld>
             <a:endParaRPr lang="en-US"/>
           </a:p>
@@ -2112,7 +2118,7 @@
           <a:p>
             <a:fld id="{2A29526C-FCA9-4192-994E-C57D3FD5424C}" type="datetimeFigureOut">
               <a:rPr lang="en-US" smtClean="0"/>
-              <a:t>11/24/2016</a:t>
+              <a:t>12/6/2016</a:t>
             </a:fld>
             <a:endParaRPr lang="en-US"/>
           </a:p>
@@ -2364,7 +2370,7 @@
           <a:p>
             <a:fld id="{2A29526C-FCA9-4192-994E-C57D3FD5424C}" type="datetimeFigureOut">
               <a:rPr lang="en-US" smtClean="0"/>
-              <a:t>11/24/2016</a:t>
+              <a:t>12/6/2016</a:t>
             </a:fld>
             <a:endParaRPr lang="en-US"/>
           </a:p>
@@ -2575,7 +2581,7 @@
           <a:p>
             <a:fld id="{2A29526C-FCA9-4192-994E-C57D3FD5424C}" type="datetimeFigureOut">
               <a:rPr lang="en-US" smtClean="0"/>
-              <a:t>11/24/2016</a:t>
+              <a:t>12/6/2016</a:t>
             </a:fld>
             <a:endParaRPr lang="en-US"/>
           </a:p>
@@ -3790,7 +3796,7 @@
       </p:grpSpPr>
       <p:pic>
         <p:nvPicPr>
-          <p:cNvPr id="2" name="Picture 1"/>
+          <p:cNvPr id="3" name="Picture 2"/>
           <p:cNvPicPr>
             <a:picLocks noChangeAspect="1"/>
           </p:cNvPicPr>
@@ -3804,8 +3810,8 @@
         </p:blipFill>
         <p:spPr>
           <a:xfrm>
-            <a:off x="110834" y="348280"/>
-            <a:ext cx="7480620" cy="5815013"/>
+            <a:off x="13978" y="797687"/>
+            <a:ext cx="6915150" cy="5286375"/>
           </a:xfrm>
           <a:prstGeom prst="rect">
             <a:avLst/>
@@ -3820,7 +3826,7 @@
         </p:nvCxnSpPr>
         <p:spPr>
           <a:xfrm flipH="1" flipV="1">
-            <a:off x="3859479" y="2719448"/>
+            <a:off x="3657599" y="3087582"/>
             <a:ext cx="1104405" cy="11875"/>
           </a:xfrm>
           <a:prstGeom prst="straightConnector1">
@@ -3886,7 +3892,7 @@
         </p:nvSpPr>
         <p:spPr>
           <a:xfrm>
-            <a:off x="4560125" y="2386938"/>
+            <a:off x="4358245" y="2755072"/>
             <a:ext cx="2710999" cy="369332"/>
           </a:xfrm>
           <a:prstGeom prst="rect">
@@ -3918,7 +3924,7 @@
         </p:nvSpPr>
         <p:spPr>
           <a:xfrm>
-            <a:off x="5367645" y="4833255"/>
+            <a:off x="5961410" y="4952007"/>
             <a:ext cx="2108269" cy="369332"/>
           </a:xfrm>
           <a:prstGeom prst="rect">
@@ -8422,7 +8428,7 @@
         </p:nvSpPr>
         <p:spPr>
           <a:xfrm>
-            <a:off x="130628" y="6240918"/>
+            <a:off x="130628" y="6442798"/>
             <a:ext cx="10485912" cy="369332"/>
           </a:xfrm>
           <a:prstGeom prst="rect">
@@ -8444,7 +8450,7 @@
       </p:sp>
       <p:pic>
         <p:nvPicPr>
-          <p:cNvPr id="9" name="Picture 8"/>
+          <p:cNvPr id="2" name="Picture 1"/>
           <p:cNvPicPr>
             <a:picLocks noChangeAspect="1"/>
           </p:cNvPicPr>
@@ -8458,8 +8464,8 @@
         </p:blipFill>
         <p:spPr>
           <a:xfrm>
-            <a:off x="868259" y="526175"/>
-            <a:ext cx="9010650" cy="5581650"/>
+            <a:off x="969197" y="393083"/>
+            <a:ext cx="8982323" cy="5947479"/>
           </a:xfrm>
           <a:prstGeom prst="rect">
             <a:avLst/>
@@ -8496,46 +8502,9 @@
           <a:chExt cx="0" cy="0"/>
         </a:xfrm>
       </p:grpSpPr>
-      <p:sp>
-        <p:nvSpPr>
-          <p:cNvPr id="4" name="TextBox 3"/>
-          <p:cNvSpPr txBox="1"/>
-          <p:nvPr/>
-        </p:nvSpPr>
-        <p:spPr>
-          <a:xfrm>
-            <a:off x="593766" y="261257"/>
-            <a:ext cx="9288505" cy="369332"/>
-          </a:xfrm>
-          <a:prstGeom prst="rect">
-            <a:avLst/>
-          </a:prstGeom>
-          <a:noFill/>
-        </p:spPr>
-        <p:txBody>
-          <a:bodyPr wrap="none" rtlCol="0">
-            <a:spAutoFit/>
-          </a:bodyPr>
-          <a:lstStyle/>
-          <a:p>
-            <a:r>
-              <a:rPr lang="en-US" dirty="0"/>
-              <a:t>As has been noted many times in the literature, </a:t>
-            </a:r>
-            <a:r>
-              <a:rPr lang="en-US" dirty="0" err="1"/>
-              <a:t>RandomForest</a:t>
-            </a:r>
-            <a:r>
-              <a:rPr lang="en-US" dirty="0"/>
-              <a:t> works best for microbiome data…</a:t>
-            </a:r>
-          </a:p>
-        </p:txBody>
-      </p:sp>
       <p:pic>
         <p:nvPicPr>
-          <p:cNvPr id="5" name="Picture 4"/>
+          <p:cNvPr id="2" name="Picture 1"/>
           <p:cNvPicPr>
             <a:picLocks noChangeAspect="1"/>
           </p:cNvPicPr>
@@ -8549,8 +8518,145 @@
         </p:blipFill>
         <p:spPr>
           <a:xfrm>
-            <a:off x="248330" y="1203985"/>
-            <a:ext cx="5381625" cy="1504950"/>
+            <a:off x="1653144" y="1008475"/>
+            <a:ext cx="6338950" cy="5169262"/>
+          </a:xfrm>
+          <a:prstGeom prst="rect">
+            <a:avLst/>
+          </a:prstGeom>
+        </p:spPr>
+      </p:pic>
+      <p:sp>
+        <p:nvSpPr>
+          <p:cNvPr id="3" name="TextBox 2"/>
+          <p:cNvSpPr txBox="1"/>
+          <p:nvPr/>
+        </p:nvSpPr>
+        <p:spPr>
+          <a:xfrm>
+            <a:off x="1306286" y="178130"/>
+            <a:ext cx="6041077" cy="369332"/>
+          </a:xfrm>
+          <a:prstGeom prst="rect">
+            <a:avLst/>
+          </a:prstGeom>
+          <a:noFill/>
+        </p:spPr>
+        <p:txBody>
+          <a:bodyPr wrap="none" rtlCol="0">
+            <a:spAutoFit/>
+          </a:bodyPr>
+          <a:lstStyle/>
+          <a:p>
+            <a:r>
+              <a:rPr lang="en-US" dirty="0">
+                <a:latin typeface="Arial" panose="020B0604020202020204" pitchFamily="34" charset="0"/>
+                <a:cs typeface="Arial" panose="020B0604020202020204" pitchFamily="34" charset="0"/>
+              </a:rPr>
+              <a:t>We can look at the ROC curves for a visual comparison…</a:t>
+            </a:r>
+          </a:p>
+        </p:txBody>
+      </p:sp>
+    </p:spTree>
+    <p:extLst>
+      <p:ext uri="{BB962C8B-B14F-4D97-AF65-F5344CB8AC3E}">
+        <p14:creationId xmlns:p14="http://schemas.microsoft.com/office/powerpoint/2010/main" val="1100388762"/>
+      </p:ext>
+    </p:extLst>
+  </p:cSld>
+  <p:clrMapOvr>
+    <a:masterClrMapping/>
+  </p:clrMapOvr>
+</p:sld>
+</file>
+
+<file path=ppt/slides/slide34.xml><?xml version="1.0" encoding="utf-8"?>
+<p:sld xmlns:a="http://schemas.openxmlformats.org/drawingml/2006/main" xmlns:r="http://schemas.openxmlformats.org/officeDocument/2006/relationships" xmlns:p="http://schemas.openxmlformats.org/presentationml/2006/main">
+  <p:cSld>
+    <p:spTree>
+      <p:nvGrpSpPr>
+        <p:cNvPr id="1" name=""/>
+        <p:cNvGrpSpPr/>
+        <p:nvPr/>
+      </p:nvGrpSpPr>
+      <p:grpSpPr>
+        <a:xfrm>
+          <a:off x="0" y="0"/>
+          <a:ext cx="0" cy="0"/>
+          <a:chOff x="0" y="0"/>
+          <a:chExt cx="0" cy="0"/>
+        </a:xfrm>
+      </p:grpSpPr>
+      <p:sp>
+        <p:nvSpPr>
+          <p:cNvPr id="4" name="TextBox 3"/>
+          <p:cNvSpPr txBox="1"/>
+          <p:nvPr/>
+        </p:nvSpPr>
+        <p:spPr>
+          <a:xfrm>
+            <a:off x="593766" y="261257"/>
+            <a:ext cx="9108456" cy="646331"/>
+          </a:xfrm>
+          <a:prstGeom prst="rect">
+            <a:avLst/>
+          </a:prstGeom>
+          <a:noFill/>
+        </p:spPr>
+        <p:txBody>
+          <a:bodyPr wrap="none" rtlCol="0">
+            <a:spAutoFit/>
+          </a:bodyPr>
+          <a:lstStyle/>
+          <a:p>
+            <a:r>
+              <a:rPr lang="en-US" dirty="0"/>
+              <a:t>It has been noted many times in the literature, </a:t>
+            </a:r>
+            <a:r>
+              <a:rPr lang="en-US" dirty="0" err="1"/>
+              <a:t>RandomForest</a:t>
+            </a:r>
+            <a:r>
+              <a:rPr lang="en-US" dirty="0"/>
+              <a:t> works best for microbiome data…</a:t>
+            </a:r>
+          </a:p>
+          <a:p>
+            <a:r>
+              <a:rPr lang="en-US" dirty="0"/>
+              <a:t>Here the “</a:t>
+            </a:r>
+            <a:r>
+              <a:rPr lang="en-US" dirty="0" err="1"/>
+              <a:t>OneR</a:t>
+            </a:r>
+            <a:r>
+              <a:rPr lang="en-US" dirty="0"/>
+              <a:t>” algorithm does well…</a:t>
+            </a:r>
+          </a:p>
+        </p:txBody>
+      </p:sp>
+      <p:pic>
+        <p:nvPicPr>
+          <p:cNvPr id="2" name="Picture 1"/>
+          <p:cNvPicPr>
+            <a:picLocks noChangeAspect="1"/>
+          </p:cNvPicPr>
+          <p:nvPr/>
+        </p:nvPicPr>
+        <p:blipFill>
+          <a:blip r:embed="rId2"/>
+          <a:stretch>
+            <a:fillRect/>
+          </a:stretch>
+        </p:blipFill>
+        <p:spPr>
+          <a:xfrm>
+            <a:off x="6215703" y="1111421"/>
+            <a:ext cx="5654858" cy="5385151"/>
           </a:xfrm>
           <a:prstGeom prst="rect">
             <a:avLst/>
@@ -8559,7 +8665,7 @@
       </p:pic>
       <p:pic>
         <p:nvPicPr>
-          <p:cNvPr id="6" name="Picture 5"/>
+          <p:cNvPr id="3" name="Picture 2"/>
           <p:cNvPicPr>
             <a:picLocks noChangeAspect="1"/>
           </p:cNvPicPr>
@@ -8573,8 +8679,8 @@
         </p:blipFill>
         <p:spPr>
           <a:xfrm>
-            <a:off x="5629955" y="630589"/>
-            <a:ext cx="5895975" cy="5553075"/>
+            <a:off x="154380" y="1111422"/>
+            <a:ext cx="6061323" cy="1060196"/>
           </a:xfrm>
           <a:prstGeom prst="rect">
             <a:avLst/>
@@ -8585,6 +8691,676 @@
     <p:extLst>
       <p:ext uri="{BB962C8B-B14F-4D97-AF65-F5344CB8AC3E}">
         <p14:creationId xmlns:p14="http://schemas.microsoft.com/office/powerpoint/2010/main" val="3824320682"/>
+      </p:ext>
+    </p:extLst>
+  </p:cSld>
+  <p:clrMapOvr>
+    <a:masterClrMapping/>
+  </p:clrMapOvr>
+</p:sld>
+</file>
+
+<file path=ppt/slides/slide35.xml><?xml version="1.0" encoding="utf-8"?>
+<p:sld xmlns:a="http://schemas.openxmlformats.org/drawingml/2006/main" xmlns:r="http://schemas.openxmlformats.org/officeDocument/2006/relationships" xmlns:p="http://schemas.openxmlformats.org/presentationml/2006/main">
+  <p:cSld>
+    <p:spTree>
+      <p:nvGrpSpPr>
+        <p:cNvPr id="1" name=""/>
+        <p:cNvGrpSpPr/>
+        <p:nvPr/>
+      </p:nvGrpSpPr>
+      <p:grpSpPr>
+        <a:xfrm>
+          <a:off x="0" y="0"/>
+          <a:ext cx="0" cy="0"/>
+          <a:chOff x="0" y="0"/>
+          <a:chExt cx="0" cy="0"/>
+        </a:xfrm>
+      </p:grpSpPr>
+      <p:pic>
+        <p:nvPicPr>
+          <p:cNvPr id="2" name="Picture 1"/>
+          <p:cNvPicPr>
+            <a:picLocks noChangeAspect="1"/>
+          </p:cNvPicPr>
+          <p:nvPr/>
+        </p:nvPicPr>
+        <p:blipFill>
+          <a:blip r:embed="rId2"/>
+          <a:stretch>
+            <a:fillRect/>
+          </a:stretch>
+        </p:blipFill>
+        <p:spPr>
+          <a:xfrm>
+            <a:off x="141142" y="660876"/>
+            <a:ext cx="5686180" cy="5859874"/>
+          </a:xfrm>
+          <a:prstGeom prst="rect">
+            <a:avLst/>
+          </a:prstGeom>
+        </p:spPr>
+      </p:pic>
+      <p:sp>
+        <p:nvSpPr>
+          <p:cNvPr id="3" name="TextBox 2"/>
+          <p:cNvSpPr txBox="1"/>
+          <p:nvPr/>
+        </p:nvSpPr>
+        <p:spPr>
+          <a:xfrm>
+            <a:off x="391886" y="106878"/>
+            <a:ext cx="11145039" cy="646331"/>
+          </a:xfrm>
+          <a:prstGeom prst="rect">
+            <a:avLst/>
+          </a:prstGeom>
+          <a:noFill/>
+        </p:spPr>
+        <p:txBody>
+          <a:bodyPr wrap="none" rtlCol="0">
+            <a:spAutoFit/>
+          </a:bodyPr>
+          <a:lstStyle/>
+          <a:p>
+            <a:r>
+              <a:rPr lang="en-US" dirty="0">
+                <a:latin typeface="Arial" panose="020B0604020202020204" pitchFamily="34" charset="0"/>
+                <a:cs typeface="Arial" panose="020B0604020202020204" pitchFamily="34" charset="0"/>
+              </a:rPr>
+              <a:t>We can easily expand our classifier pool (commented out classifiers don’t work on binary data or don’t have</a:t>
+            </a:r>
+          </a:p>
+          <a:p>
+            <a:r>
+              <a:rPr lang="en-US" dirty="0">
+                <a:latin typeface="Arial" panose="020B0604020202020204" pitchFamily="34" charset="0"/>
+                <a:cs typeface="Arial" panose="020B0604020202020204" pitchFamily="34" charset="0"/>
+              </a:rPr>
+              <a:t>Default constructors/parameter sets or otherwise threw an Exception…)</a:t>
+            </a:r>
+          </a:p>
+        </p:txBody>
+      </p:sp>
+      <p:sp>
+        <p:nvSpPr>
+          <p:cNvPr id="4" name="Rectangle 3"/>
+          <p:cNvSpPr/>
+          <p:nvPr/>
+        </p:nvSpPr>
+        <p:spPr>
+          <a:xfrm>
+            <a:off x="4389910" y="6452167"/>
+            <a:ext cx="11285517" cy="276999"/>
+          </a:xfrm>
+          <a:prstGeom prst="rect">
+            <a:avLst/>
+          </a:prstGeom>
+        </p:spPr>
+        <p:txBody>
+          <a:bodyPr wrap="square">
+            <a:spAutoFit/>
+          </a:bodyPr>
+          <a:lstStyle/>
+          <a:p>
+            <a:r>
+              <a:rPr lang="en-US" sz="1200" dirty="0"/>
+              <a:t>https://github.com/afodor/WekaExamples/blob/master/src/metaMergers/RunAllClassifiersVsAllDataLocal.java</a:t>
+            </a:r>
+          </a:p>
+        </p:txBody>
+      </p:sp>
+      <p:sp>
+        <p:nvSpPr>
+          <p:cNvPr id="5" name="TextBox 4"/>
+          <p:cNvSpPr txBox="1"/>
+          <p:nvPr/>
+        </p:nvSpPr>
+        <p:spPr>
+          <a:xfrm>
+            <a:off x="3918858" y="5723906"/>
+            <a:ext cx="1925848" cy="369332"/>
+          </a:xfrm>
+          <a:prstGeom prst="rect">
+            <a:avLst/>
+          </a:prstGeom>
+          <a:noFill/>
+        </p:spPr>
+        <p:txBody>
+          <a:bodyPr wrap="none" rtlCol="0">
+            <a:spAutoFit/>
+          </a:bodyPr>
+          <a:lstStyle/>
+          <a:p>
+            <a:r>
+              <a:rPr lang="en-US" dirty="0"/>
+              <a:t>(I got as far as L….)</a:t>
+            </a:r>
+          </a:p>
+        </p:txBody>
+      </p:sp>
+    </p:spTree>
+    <p:extLst>
+      <p:ext uri="{BB962C8B-B14F-4D97-AF65-F5344CB8AC3E}">
+        <p14:creationId xmlns:p14="http://schemas.microsoft.com/office/powerpoint/2010/main" val="2470193526"/>
+      </p:ext>
+    </p:extLst>
+  </p:cSld>
+  <p:clrMapOvr>
+    <a:masterClrMapping/>
+  </p:clrMapOvr>
+</p:sld>
+</file>
+
+<file path=ppt/slides/slide36.xml><?xml version="1.0" encoding="utf-8"?>
+<p:sld xmlns:a="http://schemas.openxmlformats.org/drawingml/2006/main" xmlns:r="http://schemas.openxmlformats.org/officeDocument/2006/relationships" xmlns:p="http://schemas.openxmlformats.org/presentationml/2006/main">
+  <p:cSld>
+    <p:spTree>
+      <p:nvGrpSpPr>
+        <p:cNvPr id="1" name=""/>
+        <p:cNvGrpSpPr/>
+        <p:nvPr/>
+      </p:nvGrpSpPr>
+      <p:grpSpPr>
+        <a:xfrm>
+          <a:off x="0" y="0"/>
+          <a:ext cx="0" cy="0"/>
+          <a:chOff x="0" y="0"/>
+          <a:chExt cx="0" cy="0"/>
+        </a:xfrm>
+      </p:grpSpPr>
+      <p:sp>
+        <p:nvSpPr>
+          <p:cNvPr id="2" name="TextBox 1"/>
+          <p:cNvSpPr txBox="1"/>
+          <p:nvPr/>
+        </p:nvSpPr>
+        <p:spPr>
+          <a:xfrm>
+            <a:off x="558140" y="178131"/>
+            <a:ext cx="6712094" cy="369332"/>
+          </a:xfrm>
+          <a:prstGeom prst="rect">
+            <a:avLst/>
+          </a:prstGeom>
+          <a:noFill/>
+        </p:spPr>
+        <p:txBody>
+          <a:bodyPr wrap="none" rtlCol="0">
+            <a:spAutoFit/>
+          </a:bodyPr>
+          <a:lstStyle/>
+          <a:p>
+            <a:r>
+              <a:rPr lang="en-US" dirty="0">
+                <a:latin typeface="Arial" panose="020B0604020202020204" pitchFamily="34" charset="0"/>
+                <a:cs typeface="Arial" panose="020B0604020202020204" pitchFamily="34" charset="0"/>
+              </a:rPr>
+              <a:t>On our adenomas dataset at the genus level, </a:t>
+            </a:r>
+            <a:r>
+              <a:rPr lang="en-US" dirty="0" err="1">
+                <a:latin typeface="Arial" panose="020B0604020202020204" pitchFamily="34" charset="0"/>
+                <a:cs typeface="Arial" panose="020B0604020202020204" pitchFamily="34" charset="0"/>
+              </a:rPr>
+              <a:t>OneR</a:t>
+            </a:r>
+            <a:r>
+              <a:rPr lang="en-US" dirty="0">
+                <a:latin typeface="Arial" panose="020B0604020202020204" pitchFamily="34" charset="0"/>
+                <a:cs typeface="Arial" panose="020B0604020202020204" pitchFamily="34" charset="0"/>
+              </a:rPr>
+              <a:t> does well…</a:t>
+            </a:r>
+          </a:p>
+        </p:txBody>
+      </p:sp>
+      <p:sp>
+        <p:nvSpPr>
+          <p:cNvPr id="3" name="Rectangle 2"/>
+          <p:cNvSpPr/>
+          <p:nvPr/>
+        </p:nvSpPr>
+        <p:spPr>
+          <a:xfrm>
+            <a:off x="3356758" y="6488668"/>
+            <a:ext cx="9516094" cy="369332"/>
+          </a:xfrm>
+          <a:prstGeom prst="rect">
+            <a:avLst/>
+          </a:prstGeom>
+        </p:spPr>
+        <p:txBody>
+          <a:bodyPr wrap="square">
+            <a:spAutoFit/>
+          </a:bodyPr>
+          <a:lstStyle/>
+          <a:p>
+            <a:r>
+              <a:rPr lang="en-US" dirty="0"/>
+              <a:t>https://github.com/afodor/WekaExamples/blob/master/src/metaMergers/plotAllVsAll.txt</a:t>
+            </a:r>
+          </a:p>
+        </p:txBody>
+      </p:sp>
+      <p:pic>
+        <p:nvPicPr>
+          <p:cNvPr id="4" name="Picture 3"/>
+          <p:cNvPicPr>
+            <a:picLocks noChangeAspect="1"/>
+          </p:cNvPicPr>
+          <p:nvPr/>
+        </p:nvPicPr>
+        <p:blipFill>
+          <a:blip r:embed="rId2"/>
+          <a:stretch>
+            <a:fillRect/>
+          </a:stretch>
+        </p:blipFill>
+        <p:spPr>
+          <a:xfrm>
+            <a:off x="1099952" y="547463"/>
+            <a:ext cx="7937170" cy="5848440"/>
+          </a:xfrm>
+          <a:prstGeom prst="rect">
+            <a:avLst/>
+          </a:prstGeom>
+        </p:spPr>
+      </p:pic>
+      <p:cxnSp>
+        <p:nvCxnSpPr>
+          <p:cNvPr id="6" name="Straight Arrow Connector 5"/>
+          <p:cNvCxnSpPr/>
+          <p:nvPr/>
+        </p:nvCxnSpPr>
+        <p:spPr>
+          <a:xfrm flipH="1">
+            <a:off x="7422078" y="878774"/>
+            <a:ext cx="308758" cy="332509"/>
+          </a:xfrm>
+          <a:prstGeom prst="straightConnector1">
+            <a:avLst/>
+          </a:prstGeom>
+          <a:ln>
+            <a:tailEnd type="triangle"/>
+          </a:ln>
+        </p:spPr>
+        <p:style>
+          <a:lnRef idx="1">
+            <a:schemeClr val="accent1"/>
+          </a:lnRef>
+          <a:fillRef idx="0">
+            <a:schemeClr val="accent1"/>
+          </a:fillRef>
+          <a:effectRef idx="0">
+            <a:schemeClr val="accent1"/>
+          </a:effectRef>
+          <a:fontRef idx="minor">
+            <a:schemeClr val="tx1"/>
+          </a:fontRef>
+        </p:style>
+      </p:cxnSp>
+    </p:spTree>
+    <p:extLst>
+      <p:ext uri="{BB962C8B-B14F-4D97-AF65-F5344CB8AC3E}">
+        <p14:creationId xmlns:p14="http://schemas.microsoft.com/office/powerpoint/2010/main" val="3604448459"/>
+      </p:ext>
+    </p:extLst>
+  </p:cSld>
+  <p:clrMapOvr>
+    <a:masterClrMapping/>
+  </p:clrMapOvr>
+</p:sld>
+</file>
+
+<file path=ppt/slides/slide37.xml><?xml version="1.0" encoding="utf-8"?>
+<p:sld xmlns:a="http://schemas.openxmlformats.org/drawingml/2006/main" xmlns:r="http://schemas.openxmlformats.org/officeDocument/2006/relationships" xmlns:p="http://schemas.openxmlformats.org/presentationml/2006/main">
+  <p:cSld>
+    <p:spTree>
+      <p:nvGrpSpPr>
+        <p:cNvPr id="1" name=""/>
+        <p:cNvGrpSpPr/>
+        <p:nvPr/>
+      </p:nvGrpSpPr>
+      <p:grpSpPr>
+        <a:xfrm>
+          <a:off x="0" y="0"/>
+          <a:ext cx="0" cy="0"/>
+          <a:chOff x="0" y="0"/>
+          <a:chExt cx="0" cy="0"/>
+        </a:xfrm>
+      </p:grpSpPr>
+      <p:sp>
+        <p:nvSpPr>
+          <p:cNvPr id="2" name="TextBox 1"/>
+          <p:cNvSpPr txBox="1"/>
+          <p:nvPr/>
+        </p:nvSpPr>
+        <p:spPr>
+          <a:xfrm>
+            <a:off x="665019" y="59377"/>
+            <a:ext cx="6211957" cy="369332"/>
+          </a:xfrm>
+          <a:prstGeom prst="rect">
+            <a:avLst/>
+          </a:prstGeom>
+          <a:noFill/>
+        </p:spPr>
+        <p:txBody>
+          <a:bodyPr wrap="none" rtlCol="0">
+            <a:spAutoFit/>
+          </a:bodyPr>
+          <a:lstStyle/>
+          <a:p>
+            <a:r>
+              <a:rPr lang="en-US" dirty="0">
+                <a:latin typeface="Arial" panose="020B0604020202020204" pitchFamily="34" charset="0"/>
+                <a:cs typeface="Arial" panose="020B0604020202020204" pitchFamily="34" charset="0"/>
+              </a:rPr>
+              <a:t>But </a:t>
+            </a:r>
+            <a:r>
+              <a:rPr lang="en-US" dirty="0" err="1">
+                <a:latin typeface="Arial" panose="020B0604020202020204" pitchFamily="34" charset="0"/>
+                <a:cs typeface="Arial" panose="020B0604020202020204" pitchFamily="34" charset="0"/>
+              </a:rPr>
+              <a:t>RandomForest</a:t>
+            </a:r>
+            <a:r>
+              <a:rPr lang="en-US" dirty="0">
+                <a:latin typeface="Arial" panose="020B0604020202020204" pitchFamily="34" charset="0"/>
+                <a:cs typeface="Arial" panose="020B0604020202020204" pitchFamily="34" charset="0"/>
+              </a:rPr>
+              <a:t> is more reliable across other datasets…</a:t>
+            </a:r>
+          </a:p>
+        </p:txBody>
+      </p:sp>
+      <p:pic>
+        <p:nvPicPr>
+          <p:cNvPr id="3" name="Picture 2"/>
+          <p:cNvPicPr>
+            <a:picLocks noChangeAspect="1"/>
+          </p:cNvPicPr>
+          <p:nvPr/>
+        </p:nvPicPr>
+        <p:blipFill>
+          <a:blip r:embed="rId2"/>
+          <a:stretch>
+            <a:fillRect/>
+          </a:stretch>
+        </p:blipFill>
+        <p:spPr>
+          <a:xfrm>
+            <a:off x="1738312" y="442912"/>
+            <a:ext cx="8854478" cy="6067495"/>
+          </a:xfrm>
+          <a:prstGeom prst="rect">
+            <a:avLst/>
+          </a:prstGeom>
+        </p:spPr>
+      </p:pic>
+      <p:cxnSp>
+        <p:nvCxnSpPr>
+          <p:cNvPr id="5" name="Straight Arrow Connector 4"/>
+          <p:cNvCxnSpPr/>
+          <p:nvPr/>
+        </p:nvCxnSpPr>
+        <p:spPr>
+          <a:xfrm flipH="1">
+            <a:off x="8372104" y="1330036"/>
+            <a:ext cx="368135" cy="439387"/>
+          </a:xfrm>
+          <a:prstGeom prst="straightConnector1">
+            <a:avLst/>
+          </a:prstGeom>
+          <a:ln>
+            <a:tailEnd type="triangle"/>
+          </a:ln>
+        </p:spPr>
+        <p:style>
+          <a:lnRef idx="1">
+            <a:schemeClr val="accent1"/>
+          </a:lnRef>
+          <a:fillRef idx="0">
+            <a:schemeClr val="accent1"/>
+          </a:fillRef>
+          <a:effectRef idx="0">
+            <a:schemeClr val="accent1"/>
+          </a:effectRef>
+          <a:fontRef idx="minor">
+            <a:schemeClr val="tx1"/>
+          </a:fontRef>
+        </p:style>
+      </p:cxnSp>
+    </p:spTree>
+    <p:extLst>
+      <p:ext uri="{BB962C8B-B14F-4D97-AF65-F5344CB8AC3E}">
+        <p14:creationId xmlns:p14="http://schemas.microsoft.com/office/powerpoint/2010/main" val="3712954476"/>
+      </p:ext>
+    </p:extLst>
+  </p:cSld>
+  <p:clrMapOvr>
+    <a:masterClrMapping/>
+  </p:clrMapOvr>
+</p:sld>
+</file>
+
+<file path=ppt/slides/slide38.xml><?xml version="1.0" encoding="utf-8"?>
+<p:sld xmlns:a="http://schemas.openxmlformats.org/drawingml/2006/main" xmlns:r="http://schemas.openxmlformats.org/officeDocument/2006/relationships" xmlns:p="http://schemas.openxmlformats.org/presentationml/2006/main">
+  <p:cSld>
+    <p:spTree>
+      <p:nvGrpSpPr>
+        <p:cNvPr id="1" name=""/>
+        <p:cNvGrpSpPr/>
+        <p:nvPr/>
+      </p:nvGrpSpPr>
+      <p:grpSpPr>
+        <a:xfrm>
+          <a:off x="0" y="0"/>
+          <a:ext cx="0" cy="0"/>
+          <a:chOff x="0" y="0"/>
+          <a:chExt cx="0" cy="0"/>
+        </a:xfrm>
+      </p:grpSpPr>
+      <p:pic>
+        <p:nvPicPr>
+          <p:cNvPr id="2" name="Picture 1"/>
+          <p:cNvPicPr>
+            <a:picLocks noChangeAspect="1"/>
+          </p:cNvPicPr>
+          <p:nvPr/>
+        </p:nvPicPr>
+        <p:blipFill>
+          <a:blip r:embed="rId2"/>
+          <a:stretch>
+            <a:fillRect/>
+          </a:stretch>
+        </p:blipFill>
+        <p:spPr>
+          <a:xfrm>
+            <a:off x="1269237" y="319087"/>
+            <a:ext cx="9629775" cy="6219825"/>
+          </a:xfrm>
+          <a:prstGeom prst="rect">
+            <a:avLst/>
+          </a:prstGeom>
+        </p:spPr>
+      </p:pic>
+      <p:cxnSp>
+        <p:nvCxnSpPr>
+          <p:cNvPr id="4" name="Straight Arrow Connector 3"/>
+          <p:cNvCxnSpPr/>
+          <p:nvPr/>
+        </p:nvCxnSpPr>
+        <p:spPr>
+          <a:xfrm flipH="1">
+            <a:off x="8455231" y="522514"/>
+            <a:ext cx="534390" cy="676894"/>
+          </a:xfrm>
+          <a:prstGeom prst="straightConnector1">
+            <a:avLst/>
+          </a:prstGeom>
+          <a:ln>
+            <a:tailEnd type="triangle"/>
+          </a:ln>
+        </p:spPr>
+        <p:style>
+          <a:lnRef idx="1">
+            <a:schemeClr val="accent1"/>
+          </a:lnRef>
+          <a:fillRef idx="0">
+            <a:schemeClr val="accent1"/>
+          </a:fillRef>
+          <a:effectRef idx="0">
+            <a:schemeClr val="accent1"/>
+          </a:effectRef>
+          <a:fontRef idx="minor">
+            <a:schemeClr val="tx1"/>
+          </a:fontRef>
+        </p:style>
+      </p:cxnSp>
+    </p:spTree>
+    <p:extLst>
+      <p:ext uri="{BB962C8B-B14F-4D97-AF65-F5344CB8AC3E}">
+        <p14:creationId xmlns:p14="http://schemas.microsoft.com/office/powerpoint/2010/main" val="937288057"/>
+      </p:ext>
+    </p:extLst>
+  </p:cSld>
+  <p:clrMapOvr>
+    <a:masterClrMapping/>
+  </p:clrMapOvr>
+</p:sld>
+</file>
+
+<file path=ppt/slides/slide39.xml><?xml version="1.0" encoding="utf-8"?>
+<p:sld xmlns:a="http://schemas.openxmlformats.org/drawingml/2006/main" xmlns:r="http://schemas.openxmlformats.org/officeDocument/2006/relationships" xmlns:p="http://schemas.openxmlformats.org/presentationml/2006/main">
+  <p:cSld>
+    <p:spTree>
+      <p:nvGrpSpPr>
+        <p:cNvPr id="1" name=""/>
+        <p:cNvGrpSpPr/>
+        <p:nvPr/>
+      </p:nvGrpSpPr>
+      <p:grpSpPr>
+        <a:xfrm>
+          <a:off x="0" y="0"/>
+          <a:ext cx="0" cy="0"/>
+          <a:chOff x="0" y="0"/>
+          <a:chExt cx="0" cy="0"/>
+        </a:xfrm>
+      </p:grpSpPr>
+      <p:pic>
+        <p:nvPicPr>
+          <p:cNvPr id="2" name="Picture 1"/>
+          <p:cNvPicPr>
+            <a:picLocks noChangeAspect="1"/>
+          </p:cNvPicPr>
+          <p:nvPr/>
+        </p:nvPicPr>
+        <p:blipFill>
+          <a:blip r:embed="rId2"/>
+          <a:stretch>
+            <a:fillRect/>
+          </a:stretch>
+        </p:blipFill>
+        <p:spPr>
+          <a:xfrm>
+            <a:off x="1998270" y="804369"/>
+            <a:ext cx="7668245" cy="5886505"/>
+          </a:xfrm>
+          <a:prstGeom prst="rect">
+            <a:avLst/>
+          </a:prstGeom>
+        </p:spPr>
+      </p:pic>
+      <p:sp>
+        <p:nvSpPr>
+          <p:cNvPr id="3" name="TextBox 2"/>
+          <p:cNvSpPr txBox="1"/>
+          <p:nvPr/>
+        </p:nvSpPr>
+        <p:spPr>
+          <a:xfrm>
+            <a:off x="35625" y="11876"/>
+            <a:ext cx="12362213" cy="923330"/>
+          </a:xfrm>
+          <a:prstGeom prst="rect">
+            <a:avLst/>
+          </a:prstGeom>
+          <a:noFill/>
+        </p:spPr>
+        <p:txBody>
+          <a:bodyPr wrap="square" rtlCol="0">
+            <a:spAutoFit/>
+          </a:bodyPr>
+          <a:lstStyle/>
+          <a:p>
+            <a:r>
+              <a:rPr lang="en-US" dirty="0">
+                <a:latin typeface="Arial" panose="020B0604020202020204" pitchFamily="34" charset="0"/>
+                <a:cs typeface="Arial" panose="020B0604020202020204" pitchFamily="34" charset="0"/>
+              </a:rPr>
+              <a:t>Models that have the words “boosting” or “Bagging” take a weighted average across many classifiers</a:t>
+            </a:r>
+          </a:p>
+          <a:p>
+            <a:r>
+              <a:rPr lang="en-US" dirty="0">
+                <a:latin typeface="Arial" panose="020B0604020202020204" pitchFamily="34" charset="0"/>
+                <a:cs typeface="Arial" panose="020B0604020202020204" pitchFamily="34" charset="0"/>
+              </a:rPr>
+              <a:t>(Random Forest does this as well).</a:t>
+            </a:r>
+          </a:p>
+          <a:p>
+            <a:r>
+              <a:rPr lang="en-US" dirty="0">
+                <a:latin typeface="Arial" panose="020B0604020202020204" pitchFamily="34" charset="0"/>
+                <a:cs typeface="Arial" panose="020B0604020202020204" pitchFamily="34" charset="0"/>
+              </a:rPr>
+              <a:t>This is often a good strategy for genomic (and metagenomics data)</a:t>
+            </a:r>
+          </a:p>
+        </p:txBody>
+      </p:sp>
+      <p:cxnSp>
+        <p:nvCxnSpPr>
+          <p:cNvPr id="5" name="Straight Arrow Connector 4"/>
+          <p:cNvCxnSpPr/>
+          <p:nvPr/>
+        </p:nvCxnSpPr>
+        <p:spPr>
+          <a:xfrm flipH="1">
+            <a:off x="8051470" y="1484416"/>
+            <a:ext cx="427512" cy="676893"/>
+          </a:xfrm>
+          <a:prstGeom prst="straightConnector1">
+            <a:avLst/>
+          </a:prstGeom>
+          <a:ln>
+            <a:tailEnd type="triangle"/>
+          </a:ln>
+        </p:spPr>
+        <p:style>
+          <a:lnRef idx="1">
+            <a:schemeClr val="accent1"/>
+          </a:lnRef>
+          <a:fillRef idx="0">
+            <a:schemeClr val="accent1"/>
+          </a:fillRef>
+          <a:effectRef idx="0">
+            <a:schemeClr val="accent1"/>
+          </a:effectRef>
+          <a:fontRef idx="minor">
+            <a:schemeClr val="tx1"/>
+          </a:fontRef>
+        </p:style>
+      </p:cxnSp>
+    </p:spTree>
+    <p:extLst>
+      <p:ext uri="{BB962C8B-B14F-4D97-AF65-F5344CB8AC3E}">
+        <p14:creationId xmlns:p14="http://schemas.microsoft.com/office/powerpoint/2010/main" val="724723144"/>
       </p:ext>
     </p:extLst>
   </p:cSld>
@@ -9348,7 +10124,7 @@
       </p:grpSpPr>
       <p:pic>
         <p:nvPicPr>
-          <p:cNvPr id="2" name="Picture 1"/>
+          <p:cNvPr id="4" name="Picture 3"/>
           <p:cNvPicPr>
             <a:picLocks noChangeAspect="1"/>
           </p:cNvPicPr>
@@ -9362,8 +10138,8 @@
         </p:blipFill>
         <p:spPr>
           <a:xfrm>
-            <a:off x="1856509" y="740167"/>
-            <a:ext cx="7480620" cy="5815013"/>
+            <a:off x="1070880" y="533731"/>
+            <a:ext cx="7519419" cy="5748316"/>
           </a:xfrm>
           <a:prstGeom prst="rect">
             <a:avLst/>
@@ -9410,7 +10186,7 @@
         </p:nvCxnSpPr>
         <p:spPr>
           <a:xfrm flipH="1" flipV="1">
-            <a:off x="6958940" y="5593278"/>
+            <a:off x="6887688" y="5284519"/>
             <a:ext cx="712519" cy="11875"/>
           </a:xfrm>
           <a:prstGeom prst="straightConnector1">
@@ -9443,7 +10219,7 @@
         </p:nvSpPr>
         <p:spPr>
           <a:xfrm>
-            <a:off x="7742714" y="5450774"/>
+            <a:off x="7671462" y="5142015"/>
             <a:ext cx="3583032" cy="369332"/>
           </a:xfrm>
           <a:prstGeom prst="rect">

</xml_diff>